<commit_message>
html homework 2 and new lectures
</commit_message>
<xml_diff>
--- a/4. HTML/Lectures/4. Semantic-Web.pptx
+++ b/4. HTML/Lectures/4. Semantic-Web.pptx
@@ -129,6 +129,22 @@
       </a:defRPr>
     </a:lvl9pPr>
   </p:defaultTextStyle>
+  <p:extLst>
+    <p:ext uri="{EFAFB233-063F-42B5-8137-9DF3F51BA10A}">
+      <p15:sldGuideLst xmlns:p15="http://schemas.microsoft.com/office/powerpoint/2012/main" xmlns="">
+        <p15:guide id="1" orient="horz" pos="2160">
+          <p15:clr>
+            <a:srgbClr val="A4A3A4"/>
+          </p15:clr>
+        </p15:guide>
+        <p15:guide id="2" pos="2880">
+          <p15:clr>
+            <a:srgbClr val="A4A3A4"/>
+          </p15:clr>
+        </p15:guide>
+      </p15:sldGuideLst>
+    </p:ext>
+  </p:extLst>
 </p:presentation>
 </file>
 
@@ -214,7 +230,7 @@
           <a:p>
             <a:fld id="{B604EE6E-D9E8-45CB-BEB5-3A0BC75A6CC2}" type="datetimeFigureOut">
               <a:rPr lang="en-US" smtClean="0"/>
-              <a:t>15.11.2012</a:t>
+              <a:t>3/19/2014</a:t>
             </a:fld>
             <a:endParaRPr lang="en-US"/>
           </a:p>
@@ -5533,133 +5549,6 @@
           </a:p>
         </p:txBody>
       </p:sp>
-      <p:sp>
-        <p:nvSpPr>
-          <p:cNvPr id="6" name="Text Placeholder 5"/>
-          <p:cNvSpPr>
-            <a:spLocks noGrp="1"/>
-          </p:cNvSpPr>
-          <p:nvPr>
-            <p:ph type="body" sz="quarter" idx="10"/>
-          </p:nvPr>
-        </p:nvSpPr>
-        <p:spPr/>
-        <p:txBody>
-          <a:bodyPr/>
-          <a:lstStyle/>
-          <a:p>
-            <a:r>
-              <a:rPr lang="en-US" dirty="0" smtClean="0"/>
-              <a:t>Doncho Minkov</a:t>
-            </a:r>
-            <a:endParaRPr lang="en-US" dirty="0"/>
-          </a:p>
-        </p:txBody>
-      </p:sp>
-      <p:sp>
-        <p:nvSpPr>
-          <p:cNvPr id="7" name="Text Placeholder 6"/>
-          <p:cNvSpPr>
-            <a:spLocks noGrp="1"/>
-          </p:cNvSpPr>
-          <p:nvPr>
-            <p:ph type="body" sz="quarter" idx="11"/>
-          </p:nvPr>
-        </p:nvSpPr>
-        <p:spPr/>
-        <p:txBody>
-          <a:bodyPr/>
-          <a:lstStyle/>
-          <a:p>
-            <a:r>
-              <a:rPr lang="en-US" dirty="0" smtClean="0"/>
-              <a:t>Telerik Software Academy</a:t>
-            </a:r>
-            <a:endParaRPr lang="en-US" dirty="0"/>
-          </a:p>
-        </p:txBody>
-      </p:sp>
-      <p:sp>
-        <p:nvSpPr>
-          <p:cNvPr id="8" name="Text Placeholder 7"/>
-          <p:cNvSpPr>
-            <a:spLocks noGrp="1"/>
-          </p:cNvSpPr>
-          <p:nvPr>
-            <p:ph type="body" sz="quarter" idx="12"/>
-          </p:nvPr>
-        </p:nvSpPr>
-        <p:spPr/>
-        <p:txBody>
-          <a:bodyPr/>
-          <a:lstStyle/>
-          <a:p>
-            <a:r>
-              <a:rPr lang="en-US" dirty="0" smtClean="0">
-                <a:hlinkClick r:id="rId2"/>
-              </a:rPr>
-              <a:t>http://academy.telerik.com</a:t>
-            </a:r>
-            <a:r>
-              <a:rPr lang="en-US" dirty="0" smtClean="0"/>
-              <a:t> </a:t>
-            </a:r>
-            <a:endParaRPr lang="en-US" dirty="0"/>
-          </a:p>
-        </p:txBody>
-      </p:sp>
-      <p:sp>
-        <p:nvSpPr>
-          <p:cNvPr id="9" name="Text Placeholder 8"/>
-          <p:cNvSpPr>
-            <a:spLocks noGrp="1"/>
-          </p:cNvSpPr>
-          <p:nvPr>
-            <p:ph type="body" sz="quarter" idx="13"/>
-          </p:nvPr>
-        </p:nvSpPr>
-        <p:spPr/>
-        <p:txBody>
-          <a:bodyPr/>
-          <a:lstStyle/>
-          <a:p>
-            <a:r>
-              <a:rPr lang="en-US" dirty="0" smtClean="0"/>
-              <a:t>Technical Trainer</a:t>
-            </a:r>
-            <a:endParaRPr lang="en-US" dirty="0"/>
-          </a:p>
-        </p:txBody>
-      </p:sp>
-      <p:sp>
-        <p:nvSpPr>
-          <p:cNvPr id="10" name="Text Placeholder 9"/>
-          <p:cNvSpPr>
-            <a:spLocks noGrp="1"/>
-          </p:cNvSpPr>
-          <p:nvPr>
-            <p:ph type="body" sz="quarter" idx="14"/>
-          </p:nvPr>
-        </p:nvSpPr>
-        <p:spPr/>
-        <p:txBody>
-          <a:bodyPr/>
-          <a:lstStyle/>
-          <a:p>
-            <a:r>
-              <a:rPr lang="en-US" dirty="0" smtClean="0">
-                <a:hlinkClick r:id="rId3"/>
-              </a:rPr>
-              <a:t>http://minkov.it</a:t>
-            </a:r>
-            <a:r>
-              <a:rPr lang="en-US" dirty="0" smtClean="0"/>
-              <a:t> </a:t>
-            </a:r>
-            <a:endParaRPr lang="en-US" dirty="0"/>
-          </a:p>
-        </p:txBody>
-      </p:sp>
       <p:pic>
         <p:nvPicPr>
           <p:cNvPr id="11" name="Picture 4"/>
@@ -5669,7 +5558,7 @@
           <p:nvPr/>
         </p:nvPicPr>
         <p:blipFill>
-          <a:blip r:embed="rId4" cstate="print">
+          <a:blip r:embed="rId2" cstate="print">
             <a:extLst>
               <a:ext uri="{28A0092B-C50C-407E-A947-70E740481C1C}">
                 <a14:useLocalDpi xmlns:a14="http://schemas.microsoft.com/office/drawing/2010/main" val="0"/>
@@ -5733,7 +5622,7 @@
           <p:nvPr/>
         </p:nvPicPr>
         <p:blipFill>
-          <a:blip r:embed="rId5">
+          <a:blip r:embed="rId3">
             <a:extLst>
               <a:ext uri="{28A0092B-C50C-407E-A947-70E740481C1C}">
                 <a14:useLocalDpi xmlns:a14="http://schemas.microsoft.com/office/drawing/2010/main" val="0"/>
@@ -5781,7 +5670,7 @@
           <p:nvPr/>
         </p:nvPicPr>
         <p:blipFill>
-          <a:blip r:embed="rId6">
+          <a:blip r:embed="rId4">
             <a:extLst>
               <a:ext uri="{28A0092B-C50C-407E-A947-70E740481C1C}">
                 <a14:useLocalDpi xmlns:a14="http://schemas.microsoft.com/office/drawing/2010/main" val="0"/>
@@ -5820,6 +5709,70 @@
           </a:extLst>
         </p:spPr>
       </p:pic>
+      <p:pic>
+        <p:nvPicPr>
+          <p:cNvPr id="15" name="Picture 2"/>
+          <p:cNvPicPr>
+            <a:picLocks noChangeAspect="1" noChangeArrowheads="1"/>
+          </p:cNvPicPr>
+          <p:nvPr/>
+        </p:nvPicPr>
+        <p:blipFill>
+          <a:blip r:embed="rId5">
+            <a:extLst>
+              <a:ext uri="{28A0092B-C50C-407E-A947-70E740481C1C}">
+                <a14:useLocalDpi xmlns:a14="http://schemas.microsoft.com/office/drawing/2010/main" val="0"/>
+              </a:ext>
+            </a:extLst>
+          </a:blip>
+          <a:srcRect/>
+          <a:stretch>
+            <a:fillRect/>
+          </a:stretch>
+        </p:blipFill>
+        <p:spPr bwMode="auto">
+          <a:xfrm>
+            <a:off x="131825" y="5410200"/>
+            <a:ext cx="4090987" cy="1225550"/>
+          </a:xfrm>
+          <a:prstGeom prst="rect">
+            <a:avLst/>
+          </a:prstGeom>
+          <a:noFill/>
+          <a:ln>
+            <a:noFill/>
+          </a:ln>
+          <a:effectLst/>
+          <a:extLst>
+            <a:ext uri="{909E8E84-426E-40DD-AFC4-6F175D3DCCD1}">
+              <a14:hiddenFill xmlns:a14="http://schemas.microsoft.com/office/drawing/2010/main">
+                <a:solidFill>
+                  <a:schemeClr val="accent1"/>
+                </a:solidFill>
+              </a14:hiddenFill>
+            </a:ext>
+            <a:ext uri="{91240B29-F687-4F45-9708-019B960494DF}">
+              <a14:hiddenLine xmlns:a14="http://schemas.microsoft.com/office/drawing/2010/main" w="9525">
+                <a:solidFill>
+                  <a:schemeClr val="tx1"/>
+                </a:solidFill>
+                <a:miter lim="800000"/>
+                <a:headEnd/>
+                <a:tailEnd/>
+              </a14:hiddenLine>
+            </a:ext>
+            <a:ext uri="{AF507438-7753-43E0-B8FC-AC1667EBCBE1}">
+              <a14:hiddenEffects xmlns:a14="http://schemas.microsoft.com/office/drawing/2010/main">
+                <a:effectLst>
+                  <a:outerShdw dist="35921" dir="2700000" algn="ctr" rotWithShape="0">
+                    <a:schemeClr val="bg2"/>
+                  </a:outerShdw>
+                </a:effectLst>
+              </a14:hiddenEffects>
+            </a:ext>
+          </a:extLst>
+        </p:spPr>
+      </p:pic>
     </p:spTree>
     <p:extLst>
       <p:ext uri="{BB962C8B-B14F-4D97-AF65-F5344CB8AC3E}">
@@ -5830,6 +5783,13 @@
   <p:clrMapOvr>
     <a:masterClrMapping/>
   </p:clrMapOvr>
+  <p:timing>
+    <p:tnLst>
+      <p:par>
+        <p:cTn id="1" dur="indefinite" restart="never" nodeType="tmRoot"/>
+      </p:par>
+    </p:tnLst>
+  </p:timing>
 </p:sld>
 </file>
 
@@ -5885,7 +5845,7 @@
         </p:nvSpPr>
         <p:spPr>
           <a:xfrm>
-            <a:off x="228600" y="990600"/>
+            <a:off x="228600" y="762000"/>
             <a:ext cx="8686800" cy="5715000"/>
           </a:xfrm>
         </p:spPr>
@@ -5941,6 +5901,13 @@
             <a:r>
               <a:rPr lang="en-US" dirty="0" smtClean="0"/>
               <a:t>Web pages</a:t>
+            </a:r>
+          </a:p>
+          <a:p>
+            <a:pPr lvl="2"/>
+            <a:r>
+              <a:rPr lang="en-US" dirty="0" smtClean="0"/>
+              <a:t>Make the content understandable for computers</a:t>
             </a:r>
           </a:p>
           <a:p>
@@ -6064,8 +6031,8 @@
         </p:blipFill>
         <p:spPr bwMode="auto">
           <a:xfrm>
-            <a:off x="6622638" y="4882276"/>
-            <a:ext cx="2064162" cy="1594724"/>
+            <a:off x="6781800" y="5176628"/>
+            <a:ext cx="1683162" cy="1300372"/>
           </a:xfrm>
           <a:prstGeom prst="roundRect">
             <a:avLst>
@@ -6359,6 +6326,13 @@
   <p:clrMapOvr>
     <a:masterClrMapping/>
   </p:clrMapOvr>
+  <p:timing>
+    <p:tnLst>
+      <p:par>
+        <p:cTn id="1" dur="indefinite" restart="never" nodeType="tmRoot"/>
+      </p:par>
+    </p:tnLst>
+  </p:timing>
 </p:sld>
 </file>
 
@@ -6396,7 +6370,7 @@
           <a:p>
             <a:r>
               <a:rPr lang="en-US" dirty="0" smtClean="0"/>
-              <a:t>How To Write Semantic HTML</a:t>
+              <a:t>How To Write Semantic HTML?</a:t>
             </a:r>
             <a:endParaRPr lang="en-US" dirty="0"/>
           </a:p>
@@ -6705,6 +6679,13 @@
   <p:clrMapOvr>
     <a:masterClrMapping/>
   </p:clrMapOvr>
+  <p:timing>
+    <p:tnLst>
+      <p:par>
+        <p:cTn id="1" dur="indefinite" restart="never" nodeType="tmRoot"/>
+      </p:par>
+    </p:tnLst>
+  </p:timing>
 </p:sld>
 </file>
 
@@ -6827,6 +6808,13 @@
   <p:clrMapOvr>
     <a:masterClrMapping/>
   </p:clrMapOvr>
+  <p:timing>
+    <p:tnLst>
+      <p:par>
+        <p:cTn id="1" dur="indefinite" restart="never" nodeType="tmRoot"/>
+      </p:par>
+    </p:tnLst>
+  </p:timing>
 </p:sld>
 </file>
 
@@ -8082,6 +8070,13 @@
   <p:clrMapOvr>
     <a:masterClrMapping/>
   </p:clrMapOvr>
+  <p:timing>
+    <p:tnLst>
+      <p:par>
+        <p:cTn id="1" dur="indefinite" restart="never" nodeType="tmRoot"/>
+      </p:par>
+    </p:tnLst>
+  </p:timing>
 </p:sld>
 </file>
 
@@ -8484,6 +8479,13 @@
   <p:clrMapOvr>
     <a:masterClrMapping/>
   </p:clrMapOvr>
+  <p:timing>
+    <p:tnLst>
+      <p:par>
+        <p:cTn id="1" dur="indefinite" restart="never" nodeType="tmRoot"/>
+      </p:par>
+    </p:tnLst>
+  </p:timing>
 </p:sld>
 </file>
 
@@ -8881,6 +8883,13 @@
   <p:clrMapOvr>
     <a:masterClrMapping/>
   </p:clrMapOvr>
+  <p:timing>
+    <p:tnLst>
+      <p:par>
+        <p:cTn id="1" dur="indefinite" restart="never" nodeType="tmRoot"/>
+      </p:par>
+    </p:tnLst>
+  </p:timing>
 </p:sld>
 </file>
 
@@ -9026,6 +9035,13 @@
   <p:clrMapOvr>
     <a:masterClrMapping/>
   </p:clrMapOvr>
+  <p:timing>
+    <p:tnLst>
+      <p:par>
+        <p:cTn id="1" dur="indefinite" restart="never" nodeType="tmRoot"/>
+      </p:par>
+    </p:tnLst>
+  </p:timing>
 </p:sld>
 </file>
 
@@ -9174,6 +9190,13 @@
   <p:clrMapOvr>
     <a:masterClrMapping/>
   </p:clrMapOvr>
+  <p:timing>
+    <p:tnLst>
+      <p:par>
+        <p:cTn id="1" dur="indefinite" restart="never" nodeType="tmRoot"/>
+      </p:par>
+    </p:tnLst>
+  </p:timing>
 </p:sld>
 </file>
 
@@ -9605,7 +9628,15 @@
             </a:pPr>
             <a:r>
               <a:rPr lang="en-US" dirty="0" smtClean="0"/>
-              <a:t>The styles for the emphasis text should be given with CSS</a:t>
+              <a:t>The styles for the emphasis text should </a:t>
+            </a:r>
+            <a:r>
+              <a:rPr lang="en-US" smtClean="0"/>
+              <a:t>be set with </a:t>
+            </a:r>
+            <a:r>
+              <a:rPr lang="en-US" dirty="0" smtClean="0"/>
+              <a:t>CSS</a:t>
             </a:r>
           </a:p>
           <a:p>
@@ -9949,19 +9980,7 @@
             </a:r>
             <a:r>
               <a:rPr lang="en-US" sz="2600" dirty="0" smtClean="0"/>
-              <a:t>styles in Exercise </a:t>
-            </a:r>
-            <a:r>
-              <a:rPr lang="en-US" sz="2600" dirty="0" smtClean="0"/>
-              <a:t>2 </a:t>
-            </a:r>
-            <a:r>
-              <a:rPr lang="en-US" sz="2600" dirty="0" smtClean="0"/>
-              <a:t>and Exercise </a:t>
-            </a:r>
-            <a:r>
-              <a:rPr lang="en-US" sz="2600" dirty="0" smtClean="0"/>
-              <a:t>3</a:t>
+              <a:t>styles in Exercise 2 and Exercise 3</a:t>
             </a:r>
             <a:endParaRPr lang="en-US" sz="2600" dirty="0"/>
           </a:p>
@@ -10118,6 +10137,13 @@
   <p:clrMapOvr>
     <a:masterClrMapping/>
   </p:clrMapOvr>
+  <p:timing>
+    <p:tnLst>
+      <p:par>
+        <p:cTn id="1" dur="indefinite" restart="never" nodeType="tmRoot"/>
+      </p:par>
+    </p:tnLst>
+  </p:timing>
 </p:sld>
 </file>
 
@@ -10288,6 +10314,13 @@
   <p:clrMapOvr>
     <a:masterClrMapping/>
   </p:clrMapOvr>
+  <p:timing>
+    <p:tnLst>
+      <p:par>
+        <p:cTn id="1" dur="indefinite" restart="never" nodeType="tmRoot"/>
+      </p:par>
+    </p:tnLst>
+  </p:timing>
 </p:sld>
 </file>
 
@@ -10506,6 +10539,13 @@
   <p:clrMapOvr>
     <a:masterClrMapping/>
   </p:clrMapOvr>
+  <p:timing>
+    <p:tnLst>
+      <p:par>
+        <p:cTn id="1" dur="indefinite" restart="never" nodeType="tmRoot"/>
+      </p:par>
+    </p:tnLst>
+  </p:timing>
 </p:sld>
 </file>
 
@@ -10703,6 +10743,13 @@
   <p:clrMapOvr>
     <a:masterClrMapping/>
   </p:clrMapOvr>
+  <p:timing>
+    <p:tnLst>
+      <p:par>
+        <p:cTn id="1" dur="indefinite" restart="never" nodeType="tmRoot"/>
+      </p:par>
+    </p:tnLst>
+  </p:timing>
 </p:sld>
 </file>
 
@@ -10897,6 +10944,13 @@
   <p:clrMapOvr>
     <a:masterClrMapping/>
   </p:clrMapOvr>
+  <p:timing>
+    <p:tnLst>
+      <p:par>
+        <p:cTn id="1" dur="indefinite" restart="never" nodeType="tmRoot"/>
+      </p:par>
+    </p:tnLst>
+  </p:timing>
 </p:sld>
 </file>
 

</xml_diff>